<commit_message>
collection framework, stream api
</commit_message>
<xml_diff>
--- a/syllabus.pptx
+++ b/syllabus.pptx
@@ -10,6 +10,7 @@
     <p:sldId id="259" r:id="rId4"/>
     <p:sldId id="260" r:id="rId5"/>
     <p:sldId id="261" r:id="rId6"/>
+    <p:sldId id="262" r:id="rId7"/>
   </p:sldIdLst>
   <p:sldSz cx="12192000" cy="6858000"/>
   <p:notesSz cx="6858000" cy="9144000"/>
@@ -247,7 +248,7 @@
           <a:p>
             <a:fld id="{4DDD4E63-CDA3-4F3D-A801-0F74D63B980A}" type="datetimeFigureOut">
               <a:rPr lang="en-IN" smtClean="0"/>
-              <a:t>30-10-2024</a:t>
+              <a:t>06-11-2024</a:t>
             </a:fld>
             <a:endParaRPr lang="en-IN"/>
           </a:p>
@@ -417,7 +418,7 @@
           <a:p>
             <a:fld id="{4DDD4E63-CDA3-4F3D-A801-0F74D63B980A}" type="datetimeFigureOut">
               <a:rPr lang="en-IN" smtClean="0"/>
-              <a:t>30-10-2024</a:t>
+              <a:t>06-11-2024</a:t>
             </a:fld>
             <a:endParaRPr lang="en-IN"/>
           </a:p>
@@ -597,7 +598,7 @@
           <a:p>
             <a:fld id="{4DDD4E63-CDA3-4F3D-A801-0F74D63B980A}" type="datetimeFigureOut">
               <a:rPr lang="en-IN" smtClean="0"/>
-              <a:t>30-10-2024</a:t>
+              <a:t>06-11-2024</a:t>
             </a:fld>
             <a:endParaRPr lang="en-IN"/>
           </a:p>
@@ -767,7 +768,7 @@
           <a:p>
             <a:fld id="{4DDD4E63-CDA3-4F3D-A801-0F74D63B980A}" type="datetimeFigureOut">
               <a:rPr lang="en-IN" smtClean="0"/>
-              <a:t>30-10-2024</a:t>
+              <a:t>06-11-2024</a:t>
             </a:fld>
             <a:endParaRPr lang="en-IN"/>
           </a:p>
@@ -1013,7 +1014,7 @@
           <a:p>
             <a:fld id="{4DDD4E63-CDA3-4F3D-A801-0F74D63B980A}" type="datetimeFigureOut">
               <a:rPr lang="en-IN" smtClean="0"/>
-              <a:t>30-10-2024</a:t>
+              <a:t>06-11-2024</a:t>
             </a:fld>
             <a:endParaRPr lang="en-IN"/>
           </a:p>
@@ -1245,7 +1246,7 @@
           <a:p>
             <a:fld id="{4DDD4E63-CDA3-4F3D-A801-0F74D63B980A}" type="datetimeFigureOut">
               <a:rPr lang="en-IN" smtClean="0"/>
-              <a:t>30-10-2024</a:t>
+              <a:t>06-11-2024</a:t>
             </a:fld>
             <a:endParaRPr lang="en-IN"/>
           </a:p>
@@ -1612,7 +1613,7 @@
           <a:p>
             <a:fld id="{4DDD4E63-CDA3-4F3D-A801-0F74D63B980A}" type="datetimeFigureOut">
               <a:rPr lang="en-IN" smtClean="0"/>
-              <a:t>30-10-2024</a:t>
+              <a:t>06-11-2024</a:t>
             </a:fld>
             <a:endParaRPr lang="en-IN"/>
           </a:p>
@@ -1730,7 +1731,7 @@
           <a:p>
             <a:fld id="{4DDD4E63-CDA3-4F3D-A801-0F74D63B980A}" type="datetimeFigureOut">
               <a:rPr lang="en-IN" smtClean="0"/>
-              <a:t>30-10-2024</a:t>
+              <a:t>06-11-2024</a:t>
             </a:fld>
             <a:endParaRPr lang="en-IN"/>
           </a:p>
@@ -1825,7 +1826,7 @@
           <a:p>
             <a:fld id="{4DDD4E63-CDA3-4F3D-A801-0F74D63B980A}" type="datetimeFigureOut">
               <a:rPr lang="en-IN" smtClean="0"/>
-              <a:t>30-10-2024</a:t>
+              <a:t>06-11-2024</a:t>
             </a:fld>
             <a:endParaRPr lang="en-IN"/>
           </a:p>
@@ -2102,7 +2103,7 @@
           <a:p>
             <a:fld id="{4DDD4E63-CDA3-4F3D-A801-0F74D63B980A}" type="datetimeFigureOut">
               <a:rPr lang="en-IN" smtClean="0"/>
-              <a:t>30-10-2024</a:t>
+              <a:t>06-11-2024</a:t>
             </a:fld>
             <a:endParaRPr lang="en-IN"/>
           </a:p>
@@ -2355,7 +2356,7 @@
           <a:p>
             <a:fld id="{4DDD4E63-CDA3-4F3D-A801-0F74D63B980A}" type="datetimeFigureOut">
               <a:rPr lang="en-IN" smtClean="0"/>
-              <a:t>30-10-2024</a:t>
+              <a:t>06-11-2024</a:t>
             </a:fld>
             <a:endParaRPr lang="en-IN"/>
           </a:p>
@@ -2568,7 +2569,7 @@
           <a:p>
             <a:fld id="{4DDD4E63-CDA3-4F3D-A801-0F74D63B980A}" type="datetimeFigureOut">
               <a:rPr lang="en-IN" smtClean="0"/>
-              <a:t>30-10-2024</a:t>
+              <a:t>06-11-2024</a:t>
             </a:fld>
             <a:endParaRPr lang="en-IN"/>
           </a:p>
@@ -5267,6 +5268,236 @@
 </p:sld>
 </file>
 
+<file path=ppt/slides/slide6.xml><?xml version="1.0" encoding="utf-8"?>
+<p:sld xmlns:a="http://schemas.openxmlformats.org/drawingml/2006/main" xmlns:r="http://schemas.openxmlformats.org/officeDocument/2006/relationships" xmlns:p="http://schemas.openxmlformats.org/presentationml/2006/main">
+  <p:cSld>
+    <p:spTree>
+      <p:nvGrpSpPr>
+        <p:cNvPr id="1" name=""/>
+        <p:cNvGrpSpPr/>
+        <p:nvPr/>
+      </p:nvGrpSpPr>
+      <p:grpSpPr>
+        <a:xfrm>
+          <a:off x="0" y="0"/>
+          <a:ext cx="0" cy="0"/>
+          <a:chOff x="0" y="0"/>
+          <a:chExt cx="0" cy="0"/>
+        </a:xfrm>
+      </p:grpSpPr>
+      <p:sp>
+        <p:nvSpPr>
+          <p:cNvPr id="2" name="TextBox 1"/>
+          <p:cNvSpPr txBox="1"/>
+          <p:nvPr/>
+        </p:nvSpPr>
+        <p:spPr>
+          <a:xfrm>
+            <a:off x="5525730" y="226142"/>
+            <a:ext cx="930063" cy="707886"/>
+          </a:xfrm>
+          <a:prstGeom prst="rect">
+            <a:avLst/>
+          </a:prstGeom>
+          <a:noFill/>
+        </p:spPr>
+        <p:txBody>
+          <a:bodyPr wrap="none" rtlCol="0">
+            <a:spAutoFit/>
+          </a:bodyPr>
+          <a:lstStyle/>
+          <a:p>
+            <a:r>
+              <a:rPr lang="en-US" sz="4000" b="1" dirty="0" smtClean="0"/>
+              <a:t>SET</a:t>
+            </a:r>
+            <a:endParaRPr lang="en-IN" sz="4000" b="1" dirty="0"/>
+          </a:p>
+        </p:txBody>
+      </p:sp>
+      <p:sp>
+        <p:nvSpPr>
+          <p:cNvPr id="3" name="TextBox 2"/>
+          <p:cNvSpPr txBox="1"/>
+          <p:nvPr/>
+        </p:nvSpPr>
+        <p:spPr>
+          <a:xfrm>
+            <a:off x="1514168" y="1415845"/>
+            <a:ext cx="1843133" cy="923330"/>
+          </a:xfrm>
+          <a:prstGeom prst="rect">
+            <a:avLst/>
+          </a:prstGeom>
+          <a:noFill/>
+        </p:spPr>
+        <p:txBody>
+          <a:bodyPr wrap="none" rtlCol="0">
+            <a:spAutoFit/>
+          </a:bodyPr>
+          <a:lstStyle/>
+          <a:p>
+            <a:pPr marL="285750" indent="-285750">
+              <a:buFont typeface="Arial" panose="020B0604020202020204" pitchFamily="34" charset="0"/>
+              <a:buChar char="•"/>
+            </a:pPr>
+            <a:r>
+              <a:rPr lang="en-US" dirty="0" err="1" smtClean="0"/>
+              <a:t>HashSet</a:t>
+            </a:r>
+            <a:endParaRPr lang="en-US" dirty="0" smtClean="0"/>
+          </a:p>
+          <a:p>
+            <a:pPr marL="285750" indent="-285750">
+              <a:buFont typeface="Arial" panose="020B0604020202020204" pitchFamily="34" charset="0"/>
+              <a:buChar char="•"/>
+            </a:pPr>
+            <a:r>
+              <a:rPr lang="en-US" dirty="0" err="1" smtClean="0"/>
+              <a:t>LinkedHashSet</a:t>
+            </a:r>
+            <a:endParaRPr lang="en-US" dirty="0" smtClean="0"/>
+          </a:p>
+          <a:p>
+            <a:pPr marL="285750" indent="-285750">
+              <a:buFont typeface="Arial" panose="020B0604020202020204" pitchFamily="34" charset="0"/>
+              <a:buChar char="•"/>
+            </a:pPr>
+            <a:r>
+              <a:rPr lang="en-US" dirty="0" err="1" smtClean="0"/>
+              <a:t>TreeSet</a:t>
+            </a:r>
+            <a:endParaRPr lang="en-IN" dirty="0"/>
+          </a:p>
+        </p:txBody>
+      </p:sp>
+      <p:sp>
+        <p:nvSpPr>
+          <p:cNvPr id="4" name="TextBox 3"/>
+          <p:cNvSpPr txBox="1"/>
+          <p:nvPr/>
+        </p:nvSpPr>
+        <p:spPr>
+          <a:xfrm>
+            <a:off x="7275871" y="1297858"/>
+            <a:ext cx="2656368" cy="923330"/>
+          </a:xfrm>
+          <a:prstGeom prst="rect">
+            <a:avLst/>
+          </a:prstGeom>
+          <a:noFill/>
+        </p:spPr>
+        <p:txBody>
+          <a:bodyPr wrap="none" rtlCol="0">
+            <a:spAutoFit/>
+          </a:bodyPr>
+          <a:lstStyle/>
+          <a:p>
+            <a:pPr marL="285750" indent="-285750">
+              <a:buFont typeface="Arial" panose="020B0604020202020204" pitchFamily="34" charset="0"/>
+              <a:buChar char="•"/>
+            </a:pPr>
+            <a:r>
+              <a:rPr lang="en-US" dirty="0" smtClean="0"/>
+              <a:t>Unique set of elements</a:t>
+            </a:r>
+          </a:p>
+          <a:p>
+            <a:pPr marL="285750" indent="-285750">
+              <a:buFont typeface="Arial" panose="020B0604020202020204" pitchFamily="34" charset="0"/>
+              <a:buChar char="•"/>
+            </a:pPr>
+            <a:r>
+              <a:rPr lang="en-US" dirty="0" smtClean="0"/>
+              <a:t>Insertion time log n</a:t>
+            </a:r>
+          </a:p>
+          <a:p>
+            <a:pPr marL="285750" indent="-285750">
+              <a:buFont typeface="Arial" panose="020B0604020202020204" pitchFamily="34" charset="0"/>
+              <a:buChar char="•"/>
+            </a:pPr>
+            <a:r>
+              <a:rPr lang="en-US" dirty="0" smtClean="0"/>
+              <a:t>Access time constant</a:t>
+            </a:r>
+            <a:endParaRPr lang="en-IN" dirty="0"/>
+          </a:p>
+        </p:txBody>
+      </p:sp>
+      <p:sp>
+        <p:nvSpPr>
+          <p:cNvPr id="5" name="TextBox 4"/>
+          <p:cNvSpPr txBox="1"/>
+          <p:nvPr/>
+        </p:nvSpPr>
+        <p:spPr>
+          <a:xfrm>
+            <a:off x="4021394" y="3470787"/>
+            <a:ext cx="1059906" cy="369332"/>
+          </a:xfrm>
+          <a:prstGeom prst="rect">
+            <a:avLst/>
+          </a:prstGeom>
+          <a:noFill/>
+        </p:spPr>
+        <p:txBody>
+          <a:bodyPr wrap="none" rtlCol="0">
+            <a:spAutoFit/>
+          </a:bodyPr>
+          <a:lstStyle/>
+          <a:p>
+            <a:r>
+              <a:rPr lang="en-US" dirty="0" smtClean="0"/>
+              <a:t>3,41,50,5</a:t>
+            </a:r>
+            <a:endParaRPr lang="en-IN" dirty="0"/>
+          </a:p>
+        </p:txBody>
+      </p:sp>
+      <p:sp>
+        <p:nvSpPr>
+          <p:cNvPr id="6" name="TextBox 5"/>
+          <p:cNvSpPr txBox="1"/>
+          <p:nvPr/>
+        </p:nvSpPr>
+        <p:spPr>
+          <a:xfrm>
+            <a:off x="4021394" y="4208207"/>
+            <a:ext cx="1059906" cy="369332"/>
+          </a:xfrm>
+          <a:prstGeom prst="rect">
+            <a:avLst/>
+          </a:prstGeom>
+          <a:noFill/>
+        </p:spPr>
+        <p:txBody>
+          <a:bodyPr wrap="none" rtlCol="0">
+            <a:spAutoFit/>
+          </a:bodyPr>
+          <a:lstStyle/>
+          <a:p>
+            <a:r>
+              <a:rPr lang="en-US" dirty="0" smtClean="0"/>
+              <a:t>3,5,41,50</a:t>
+            </a:r>
+            <a:endParaRPr lang="en-IN" dirty="0"/>
+          </a:p>
+        </p:txBody>
+      </p:sp>
+    </p:spTree>
+    <p:extLst>
+      <p:ext uri="{BB962C8B-B14F-4D97-AF65-F5344CB8AC3E}">
+        <p14:creationId xmlns:p14="http://schemas.microsoft.com/office/powerpoint/2010/main" val="2552724580"/>
+      </p:ext>
+    </p:extLst>
+  </p:cSld>
+  <p:clrMapOvr>
+    <a:masterClrMapping/>
+  </p:clrMapOvr>
+</p:sld>
+</file>
+
 <file path=ppt/theme/theme1.xml><?xml version="1.0" encoding="utf-8"?>
 <a:theme xmlns:a="http://schemas.openxmlformats.org/drawingml/2006/main" name="Office Theme">
   <a:themeElements>

</xml_diff>

<commit_message>
stream api, exception start
</commit_message>
<xml_diff>
--- a/syllabus.pptx
+++ b/syllabus.pptx
@@ -248,7 +248,7 @@
           <a:p>
             <a:fld id="{4DDD4E63-CDA3-4F3D-A801-0F74D63B980A}" type="datetimeFigureOut">
               <a:rPr lang="en-IN" smtClean="0"/>
-              <a:t>06-11-2024</a:t>
+              <a:t>20-11-2024</a:t>
             </a:fld>
             <a:endParaRPr lang="en-IN"/>
           </a:p>
@@ -418,7 +418,7 @@
           <a:p>
             <a:fld id="{4DDD4E63-CDA3-4F3D-A801-0F74D63B980A}" type="datetimeFigureOut">
               <a:rPr lang="en-IN" smtClean="0"/>
-              <a:t>06-11-2024</a:t>
+              <a:t>20-11-2024</a:t>
             </a:fld>
             <a:endParaRPr lang="en-IN"/>
           </a:p>
@@ -598,7 +598,7 @@
           <a:p>
             <a:fld id="{4DDD4E63-CDA3-4F3D-A801-0F74D63B980A}" type="datetimeFigureOut">
               <a:rPr lang="en-IN" smtClean="0"/>
-              <a:t>06-11-2024</a:t>
+              <a:t>20-11-2024</a:t>
             </a:fld>
             <a:endParaRPr lang="en-IN"/>
           </a:p>
@@ -768,7 +768,7 @@
           <a:p>
             <a:fld id="{4DDD4E63-CDA3-4F3D-A801-0F74D63B980A}" type="datetimeFigureOut">
               <a:rPr lang="en-IN" smtClean="0"/>
-              <a:t>06-11-2024</a:t>
+              <a:t>20-11-2024</a:t>
             </a:fld>
             <a:endParaRPr lang="en-IN"/>
           </a:p>
@@ -1014,7 +1014,7 @@
           <a:p>
             <a:fld id="{4DDD4E63-CDA3-4F3D-A801-0F74D63B980A}" type="datetimeFigureOut">
               <a:rPr lang="en-IN" smtClean="0"/>
-              <a:t>06-11-2024</a:t>
+              <a:t>20-11-2024</a:t>
             </a:fld>
             <a:endParaRPr lang="en-IN"/>
           </a:p>
@@ -1246,7 +1246,7 @@
           <a:p>
             <a:fld id="{4DDD4E63-CDA3-4F3D-A801-0F74D63B980A}" type="datetimeFigureOut">
               <a:rPr lang="en-IN" smtClean="0"/>
-              <a:t>06-11-2024</a:t>
+              <a:t>20-11-2024</a:t>
             </a:fld>
             <a:endParaRPr lang="en-IN"/>
           </a:p>
@@ -1613,7 +1613,7 @@
           <a:p>
             <a:fld id="{4DDD4E63-CDA3-4F3D-A801-0F74D63B980A}" type="datetimeFigureOut">
               <a:rPr lang="en-IN" smtClean="0"/>
-              <a:t>06-11-2024</a:t>
+              <a:t>20-11-2024</a:t>
             </a:fld>
             <a:endParaRPr lang="en-IN"/>
           </a:p>
@@ -1731,7 +1731,7 @@
           <a:p>
             <a:fld id="{4DDD4E63-CDA3-4F3D-A801-0F74D63B980A}" type="datetimeFigureOut">
               <a:rPr lang="en-IN" smtClean="0"/>
-              <a:t>06-11-2024</a:t>
+              <a:t>20-11-2024</a:t>
             </a:fld>
             <a:endParaRPr lang="en-IN"/>
           </a:p>
@@ -1826,7 +1826,7 @@
           <a:p>
             <a:fld id="{4DDD4E63-CDA3-4F3D-A801-0F74D63B980A}" type="datetimeFigureOut">
               <a:rPr lang="en-IN" smtClean="0"/>
-              <a:t>06-11-2024</a:t>
+              <a:t>20-11-2024</a:t>
             </a:fld>
             <a:endParaRPr lang="en-IN"/>
           </a:p>
@@ -2103,7 +2103,7 @@
           <a:p>
             <a:fld id="{4DDD4E63-CDA3-4F3D-A801-0F74D63B980A}" type="datetimeFigureOut">
               <a:rPr lang="en-IN" smtClean="0"/>
-              <a:t>06-11-2024</a:t>
+              <a:t>20-11-2024</a:t>
             </a:fld>
             <a:endParaRPr lang="en-IN"/>
           </a:p>
@@ -2356,7 +2356,7 @@
           <a:p>
             <a:fld id="{4DDD4E63-CDA3-4F3D-A801-0F74D63B980A}" type="datetimeFigureOut">
               <a:rPr lang="en-IN" smtClean="0"/>
-              <a:t>06-11-2024</a:t>
+              <a:t>20-11-2024</a:t>
             </a:fld>
             <a:endParaRPr lang="en-IN"/>
           </a:p>
@@ -2569,7 +2569,7 @@
           <a:p>
             <a:fld id="{4DDD4E63-CDA3-4F3D-A801-0F74D63B980A}" type="datetimeFigureOut">
               <a:rPr lang="en-IN" smtClean="0"/>
-              <a:t>06-11-2024</a:t>
+              <a:t>20-11-2024</a:t>
             </a:fld>
             <a:endParaRPr lang="en-IN"/>
           </a:p>
@@ -2983,7 +2983,7 @@
         <p:spPr>
           <a:xfrm>
             <a:off x="1347019" y="776748"/>
-            <a:ext cx="3048000" cy="2954655"/>
+            <a:ext cx="3048000" cy="3231654"/>
           </a:xfrm>
           <a:prstGeom prst="rect">
             <a:avLst/>
@@ -3007,7 +3007,11 @@
               <a:buChar char="•"/>
             </a:pPr>
             <a:r>
-              <a:rPr lang="en-US" i="1" dirty="0" smtClean="0"/>
+              <a:rPr lang="en-US" i="1" dirty="0" smtClean="0">
+                <a:solidFill>
+                  <a:schemeClr val="accent6"/>
+                </a:solidFill>
+              </a:rPr>
               <a:t>Basics (loop, if else, switch case)</a:t>
             </a:r>
           </a:p>
@@ -3017,7 +3021,11 @@
               <a:buChar char="•"/>
             </a:pPr>
             <a:r>
-              <a:rPr lang="en-US" i="1" dirty="0" smtClean="0"/>
+              <a:rPr lang="en-US" i="1" dirty="0" smtClean="0">
+                <a:solidFill>
+                  <a:schemeClr val="accent6"/>
+                </a:solidFill>
+              </a:rPr>
               <a:t>OOPs</a:t>
             </a:r>
           </a:p>
@@ -3037,7 +3045,13 @@
               <a:buChar char="•"/>
             </a:pPr>
             <a:r>
-              <a:rPr lang="en-US" dirty="0" smtClean="0"/>
+              <a:rPr lang="en-US" dirty="0" smtClean="0">
+                <a:solidFill>
+                  <a:schemeClr val="accent1">
+                    <a:lumMod val="75000"/>
+                  </a:schemeClr>
+                </a:solidFill>
+              </a:rPr>
               <a:t>Collection Framework</a:t>
             </a:r>
           </a:p>
@@ -3047,7 +3061,11 @@
               <a:buChar char="•"/>
             </a:pPr>
             <a:r>
-              <a:rPr lang="en-US" dirty="0" smtClean="0"/>
+              <a:rPr lang="en-US" dirty="0" smtClean="0">
+                <a:solidFill>
+                  <a:schemeClr val="accent6"/>
+                </a:solidFill>
+              </a:rPr>
               <a:t>Java 8</a:t>
             </a:r>
           </a:p>
@@ -3067,9 +3085,24 @@
               <a:buChar char="•"/>
             </a:pPr>
             <a:r>
+              <a:rPr lang="en-US" dirty="0" smtClean="0">
+                <a:solidFill>
+                  <a:schemeClr val="accent6"/>
+                </a:solidFill>
+              </a:rPr>
+              <a:t>String</a:t>
+            </a:r>
+          </a:p>
+          <a:p>
+            <a:pPr marL="285750" indent="-285750">
+              <a:buFont typeface="Arial" panose="020B0604020202020204" pitchFamily="34" charset="0"/>
+              <a:buChar char="•"/>
+            </a:pPr>
+            <a:r>
               <a:rPr lang="en-US" dirty="0" smtClean="0"/>
-              <a:t>String</a:t>
-            </a:r>
+              <a:t>Exception</a:t>
+            </a:r>
+            <a:endParaRPr lang="en-US" dirty="0" smtClean="0"/>
           </a:p>
           <a:p>
             <a:pPr marL="285750" indent="-285750">

</xml_diff>